<commit_message>
Updating instructions to create a better experience for attendees
Signed-off-by: Harry Kimpel <harrykimpel@hotmail.com>
</commit_message>
<xml_diff>
--- a/xxx-AgentFrameworkObservabilityWithNewRelic/Coach/Lectures.pptx
+++ b/xxx-AgentFrameworkObservabilityWithNewRelic/Coach/Lectures.pptx
@@ -136,154 +136,106 @@
 </p188:authorLst>
 </file>
 
-<file path=ppt/revisionInfo.xml><?xml version="1.0" encoding="utf-8"?>
-<p1510:revInfo xmlns:a="http://schemas.openxmlformats.org/drawingml/2006/main" xmlns:r="http://schemas.openxmlformats.org/officeDocument/2006/relationships" xmlns:p1510="http://schemas.microsoft.com/office/powerpoint/2015/10/main">
-  <p1510:revLst>
-    <p1510:client id="{58E3B4D3-A2DF-7F4C-AAEA-BED2DE260FD9}" v="11" dt="2022-09-09T01:43:33.704"/>
-  </p1510:revLst>
-</p1510:revInfo>
-</file>
-
 <file path=ppt/changesInfos/changesInfo1.xml><?xml version="1.0" encoding="utf-8"?>
 <pc:chgInfo xmlns:a="http://schemas.openxmlformats.org/drawingml/2006/main" xmlns:r="http://schemas.openxmlformats.org/officeDocument/2006/relationships" xmlns:ac="http://schemas.microsoft.com/office/drawing/2013/main/command" xmlns:pc="http://schemas.microsoft.com/office/powerpoint/2013/main/command">
   <pc:docChgLst>
-    <pc:chgData name="Peter Laudati" userId="fc1173ac-280e-4cfe-aafb-65006f84bb93" providerId="ADAL" clId="{58E3B4D3-A2DF-7F4C-AAEA-BED2DE260FD9}"/>
-    <pc:docChg chg="custSel addSld delSld modSld">
-      <pc:chgData name="Peter Laudati" userId="fc1173ac-280e-4cfe-aafb-65006f84bb93" providerId="ADAL" clId="{58E3B4D3-A2DF-7F4C-AAEA-BED2DE260FD9}" dt="2022-08-18T18:53:15.105" v="9" actId="2696"/>
+    <pc:chgData name="Harry Kimpel" userId="a4b152e4-7c2c-406b-aeaf-55c467616911" providerId="ADAL" clId="{B73FD67B-3E2F-5850-87A5-9A6C4F440222}"/>
+    <pc:docChg chg="undo custSel modSld">
+      <pc:chgData name="Harry Kimpel" userId="a4b152e4-7c2c-406b-aeaf-55c467616911" providerId="ADAL" clId="{B73FD67B-3E2F-5850-87A5-9A6C4F440222}" dt="2026-01-28T18:00:02.668" v="194" actId="20577"/>
       <pc:docMkLst>
         <pc:docMk/>
       </pc:docMkLst>
-      <pc:sldChg chg="addSp delSp modSp mod chgLayout">
-        <pc:chgData name="Peter Laudati" userId="fc1173ac-280e-4cfe-aafb-65006f84bb93" providerId="ADAL" clId="{58E3B4D3-A2DF-7F4C-AAEA-BED2DE260FD9}" dt="2022-08-18T18:50:40.408" v="0" actId="700"/>
+      <pc:sldChg chg="modSp mod">
+        <pc:chgData name="Harry Kimpel" userId="a4b152e4-7c2c-406b-aeaf-55c467616911" providerId="ADAL" clId="{B73FD67B-3E2F-5850-87A5-9A6C4F440222}" dt="2026-01-28T17:58:17.949" v="182" actId="6549"/>
+        <pc:sldMkLst>
+          <pc:docMk/>
+          <pc:sldMk cId="4086393502" sldId="509"/>
+        </pc:sldMkLst>
+        <pc:spChg chg="mod">
+          <ac:chgData name="Harry Kimpel" userId="a4b152e4-7c2c-406b-aeaf-55c467616911" providerId="ADAL" clId="{B73FD67B-3E2F-5850-87A5-9A6C4F440222}" dt="2026-01-28T17:58:17.949" v="182" actId="6549"/>
+          <ac:spMkLst>
+            <pc:docMk/>
+            <pc:sldMk cId="4086393502" sldId="509"/>
+            <ac:spMk id="4" creationId="{31D3DF15-4403-D489-FA65-6DA8B097E53F}"/>
+          </ac:spMkLst>
+        </pc:spChg>
+      </pc:sldChg>
+      <pc:sldChg chg="modSp mod">
+        <pc:chgData name="Harry Kimpel" userId="a4b152e4-7c2c-406b-aeaf-55c467616911" providerId="ADAL" clId="{B73FD67B-3E2F-5850-87A5-9A6C4F440222}" dt="2026-01-28T17:55:27.842" v="3"/>
         <pc:sldMkLst>
           <pc:docMk/>
           <pc:sldMk cId="1858828968" sldId="3635"/>
         </pc:sldMkLst>
-        <pc:spChg chg="add mod ord">
-          <ac:chgData name="Peter Laudati" userId="fc1173ac-280e-4cfe-aafb-65006f84bb93" providerId="ADAL" clId="{58E3B4D3-A2DF-7F4C-AAEA-BED2DE260FD9}" dt="2022-08-18T18:50:40.408" v="0" actId="700"/>
+        <pc:spChg chg="mod">
+          <ac:chgData name="Harry Kimpel" userId="a4b152e4-7c2c-406b-aeaf-55c467616911" providerId="ADAL" clId="{B73FD67B-3E2F-5850-87A5-9A6C4F440222}" dt="2026-01-28T17:55:27.842" v="3"/>
           <ac:spMkLst>
             <pc:docMk/>
             <pc:sldMk cId="1858828968" sldId="3635"/>
             <ac:spMk id="2" creationId="{8FF79584-2A68-E4C0-6F82-610A3B2D774A}"/>
           </ac:spMkLst>
         </pc:spChg>
-        <pc:spChg chg="mod ord">
-          <ac:chgData name="Peter Laudati" userId="fc1173ac-280e-4cfe-aafb-65006f84bb93" providerId="ADAL" clId="{58E3B4D3-A2DF-7F4C-AAEA-BED2DE260FD9}" dt="2022-08-18T18:50:40.408" v="0" actId="700"/>
+        <pc:spChg chg="mod">
+          <ac:chgData name="Harry Kimpel" userId="a4b152e4-7c2c-406b-aeaf-55c467616911" providerId="ADAL" clId="{B73FD67B-3E2F-5850-87A5-9A6C4F440222}" dt="2026-01-28T17:55:23.098" v="2" actId="20577"/>
           <ac:spMkLst>
             <pc:docMk/>
             <pc:sldMk cId="1858828968" sldId="3635"/>
             <ac:spMk id="4" creationId="{00000000-0000-0000-0000-000000000000}"/>
           </ac:spMkLst>
         </pc:spChg>
-        <pc:spChg chg="del">
-          <ac:chgData name="Peter Laudati" userId="fc1173ac-280e-4cfe-aafb-65006f84bb93" providerId="ADAL" clId="{58E3B4D3-A2DF-7F4C-AAEA-BED2DE260FD9}" dt="2022-08-18T18:50:40.408" v="0" actId="700"/>
+      </pc:sldChg>
+      <pc:sldChg chg="modSp mod">
+        <pc:chgData name="Harry Kimpel" userId="a4b152e4-7c2c-406b-aeaf-55c467616911" providerId="ADAL" clId="{B73FD67B-3E2F-5850-87A5-9A6C4F440222}" dt="2026-01-28T17:56:41.647" v="62" actId="20577"/>
+        <pc:sldMkLst>
+          <pc:docMk/>
+          <pc:sldMk cId="4163897614" sldId="3636"/>
+        </pc:sldMkLst>
+        <pc:spChg chg="mod">
+          <ac:chgData name="Harry Kimpel" userId="a4b152e4-7c2c-406b-aeaf-55c467616911" providerId="ADAL" clId="{B73FD67B-3E2F-5850-87A5-9A6C4F440222}" dt="2026-01-28T17:56:02.685" v="8"/>
           <ac:spMkLst>
             <pc:docMk/>
-            <pc:sldMk cId="1858828968" sldId="3635"/>
-            <ac:spMk id="6" creationId="{ADCCA4A4-85CC-CBC9-9F7D-0FADD8287C35}"/>
+            <pc:sldMk cId="4163897614" sldId="3636"/>
+            <ac:spMk id="3" creationId="{65EF49C9-ADEF-4199-87BD-25B691F4E4AF}"/>
+          </ac:spMkLst>
+        </pc:spChg>
+        <pc:spChg chg="mod">
+          <ac:chgData name="Harry Kimpel" userId="a4b152e4-7c2c-406b-aeaf-55c467616911" providerId="ADAL" clId="{B73FD67B-3E2F-5850-87A5-9A6C4F440222}" dt="2026-01-28T17:56:11.687" v="20" actId="20577"/>
+          <ac:spMkLst>
+            <pc:docMk/>
+            <pc:sldMk cId="4163897614" sldId="3636"/>
+            <ac:spMk id="12" creationId="{75CC7858-BF12-7E43-99A3-CE60C78A568D}"/>
+          </ac:spMkLst>
+        </pc:spChg>
+        <pc:spChg chg="mod">
+          <ac:chgData name="Harry Kimpel" userId="a4b152e4-7c2c-406b-aeaf-55c467616911" providerId="ADAL" clId="{B73FD67B-3E2F-5850-87A5-9A6C4F440222}" dt="2026-01-28T17:56:41.647" v="62" actId="20577"/>
+          <ac:spMkLst>
+            <pc:docMk/>
+            <pc:sldMk cId="4163897614" sldId="3636"/>
+            <ac:spMk id="14" creationId="{9A346C37-9DD6-7148-8A83-59A2EC49278C}"/>
           </ac:spMkLst>
         </pc:spChg>
       </pc:sldChg>
-      <pc:sldChg chg="addSp delSp modSp new del mod modClrScheme chgLayout">
-        <pc:chgData name="Peter Laudati" userId="fc1173ac-280e-4cfe-aafb-65006f84bb93" providerId="ADAL" clId="{58E3B4D3-A2DF-7F4C-AAEA-BED2DE260FD9}" dt="2022-08-18T18:53:15.105" v="9" actId="2696"/>
+      <pc:sldChg chg="modSp mod">
+        <pc:chgData name="Harry Kimpel" userId="a4b152e4-7c2c-406b-aeaf-55c467616911" providerId="ADAL" clId="{B73FD67B-3E2F-5850-87A5-9A6C4F440222}" dt="2026-01-28T18:00:02.668" v="194" actId="20577"/>
         <pc:sldMkLst>
           <pc:docMk/>
-          <pc:sldMk cId="2955131668" sldId="3676"/>
+          <pc:sldMk cId="2990754167" sldId="3673"/>
         </pc:sldMkLst>
-        <pc:spChg chg="del mod ord">
-          <ac:chgData name="Peter Laudati" userId="fc1173ac-280e-4cfe-aafb-65006f84bb93" providerId="ADAL" clId="{58E3B4D3-A2DF-7F4C-AAEA-BED2DE260FD9}" dt="2022-08-18T18:53:00.294" v="6" actId="700"/>
+        <pc:spChg chg="mod">
+          <ac:chgData name="Harry Kimpel" userId="a4b152e4-7c2c-406b-aeaf-55c467616911" providerId="ADAL" clId="{B73FD67B-3E2F-5850-87A5-9A6C4F440222}" dt="2026-01-28T18:00:02.668" v="194" actId="20577"/>
           <ac:spMkLst>
             <pc:docMk/>
-            <pc:sldMk cId="2955131668" sldId="3676"/>
-            <ac:spMk id="2" creationId="{8B96030A-A5AF-0231-924B-D611237E8878}"/>
+            <pc:sldMk cId="2990754167" sldId="3673"/>
+            <ac:spMk id="2" creationId="{B0B3C1D8-997A-3307-B567-5C31F43276DE}"/>
           </ac:spMkLst>
         </pc:spChg>
-        <pc:spChg chg="del">
-          <ac:chgData name="Peter Laudati" userId="fc1173ac-280e-4cfe-aafb-65006f84bb93" providerId="ADAL" clId="{58E3B4D3-A2DF-7F4C-AAEA-BED2DE260FD9}" dt="2022-08-18T18:53:00.294" v="6" actId="700"/>
+        <pc:spChg chg="mod">
+          <ac:chgData name="Harry Kimpel" userId="a4b152e4-7c2c-406b-aeaf-55c467616911" providerId="ADAL" clId="{B73FD67B-3E2F-5850-87A5-9A6C4F440222}" dt="2026-01-28T17:59:54.045" v="190" actId="122"/>
           <ac:spMkLst>
             <pc:docMk/>
-            <pc:sldMk cId="2955131668" sldId="3676"/>
-            <ac:spMk id="3" creationId="{092B7AF9-7723-AAF9-77C0-EA960710F7A9}"/>
+            <pc:sldMk cId="2990754167" sldId="3673"/>
+            <ac:spMk id="3" creationId="{2F3AC27F-55BE-EAA1-2E0E-6E854A75AFEC}"/>
           </ac:spMkLst>
         </pc:spChg>
-        <pc:spChg chg="del">
-          <ac:chgData name="Peter Laudati" userId="fc1173ac-280e-4cfe-aafb-65006f84bb93" providerId="ADAL" clId="{58E3B4D3-A2DF-7F4C-AAEA-BED2DE260FD9}" dt="2022-08-18T18:53:00.294" v="6" actId="700"/>
-          <ac:spMkLst>
-            <pc:docMk/>
-            <pc:sldMk cId="2955131668" sldId="3676"/>
-            <ac:spMk id="4" creationId="{CB2032A5-869A-2D79-CDA7-0D1245A03EB0}"/>
-          </ac:spMkLst>
-        </pc:spChg>
-        <pc:spChg chg="add del mod ord">
-          <ac:chgData name="Peter Laudati" userId="fc1173ac-280e-4cfe-aafb-65006f84bb93" providerId="ADAL" clId="{58E3B4D3-A2DF-7F4C-AAEA-BED2DE260FD9}" dt="2022-08-18T18:53:04.406" v="7" actId="700"/>
-          <ac:spMkLst>
-            <pc:docMk/>
-            <pc:sldMk cId="2955131668" sldId="3676"/>
-            <ac:spMk id="5" creationId="{E02AD455-A414-0690-1A17-CE7C8B748C6C}"/>
-          </ac:spMkLst>
-        </pc:spChg>
-        <pc:spChg chg="add del mod ord">
-          <ac:chgData name="Peter Laudati" userId="fc1173ac-280e-4cfe-aafb-65006f84bb93" providerId="ADAL" clId="{58E3B4D3-A2DF-7F4C-AAEA-BED2DE260FD9}" dt="2022-08-18T18:53:10.590" v="8" actId="700"/>
-          <ac:spMkLst>
-            <pc:docMk/>
-            <pc:sldMk cId="2955131668" sldId="3676"/>
-            <ac:spMk id="6" creationId="{1BF74B6F-2880-3AFF-B91D-BB103E599E77}"/>
-          </ac:spMkLst>
-        </pc:spChg>
-        <pc:spChg chg="add del mod ord">
-          <ac:chgData name="Peter Laudati" userId="fc1173ac-280e-4cfe-aafb-65006f84bb93" providerId="ADAL" clId="{58E3B4D3-A2DF-7F4C-AAEA-BED2DE260FD9}" dt="2022-08-18T18:53:10.590" v="8" actId="700"/>
-          <ac:spMkLst>
-            <pc:docMk/>
-            <pc:sldMk cId="2955131668" sldId="3676"/>
-            <ac:spMk id="7" creationId="{EF4C5732-2F8A-471E-987C-A61C94B1CD14}"/>
-          </ac:spMkLst>
-        </pc:spChg>
-        <pc:spChg chg="add del mod ord">
-          <ac:chgData name="Peter Laudati" userId="fc1173ac-280e-4cfe-aafb-65006f84bb93" providerId="ADAL" clId="{58E3B4D3-A2DF-7F4C-AAEA-BED2DE260FD9}" dt="2022-08-18T18:53:10.590" v="8" actId="700"/>
-          <ac:spMkLst>
-            <pc:docMk/>
-            <pc:sldMk cId="2955131668" sldId="3676"/>
-            <ac:spMk id="8" creationId="{4ACF6CF9-205A-DE12-0C54-EA712F8CBECE}"/>
-          </ac:spMkLst>
-        </pc:spChg>
-        <pc:spChg chg="add mod ord">
-          <ac:chgData name="Peter Laudati" userId="fc1173ac-280e-4cfe-aafb-65006f84bb93" providerId="ADAL" clId="{58E3B4D3-A2DF-7F4C-AAEA-BED2DE260FD9}" dt="2022-08-18T18:53:10.590" v="8" actId="700"/>
-          <ac:spMkLst>
-            <pc:docMk/>
-            <pc:sldMk cId="2955131668" sldId="3676"/>
-            <ac:spMk id="9" creationId="{24EDC00B-2681-1031-C0BE-FA0A65853705}"/>
-          </ac:spMkLst>
-        </pc:spChg>
-        <pc:spChg chg="add mod ord">
-          <ac:chgData name="Peter Laudati" userId="fc1173ac-280e-4cfe-aafb-65006f84bb93" providerId="ADAL" clId="{58E3B4D3-A2DF-7F4C-AAEA-BED2DE260FD9}" dt="2022-08-18T18:53:10.590" v="8" actId="700"/>
-          <ac:spMkLst>
-            <pc:docMk/>
-            <pc:sldMk cId="2955131668" sldId="3676"/>
-            <ac:spMk id="10" creationId="{7C627F91-8906-F394-82D7-60756A7DE665}"/>
-          </ac:spMkLst>
-        </pc:spChg>
-        <pc:spChg chg="add mod ord">
-          <ac:chgData name="Peter Laudati" userId="fc1173ac-280e-4cfe-aafb-65006f84bb93" providerId="ADAL" clId="{58E3B4D3-A2DF-7F4C-AAEA-BED2DE260FD9}" dt="2022-08-18T18:53:10.590" v="8" actId="700"/>
-          <ac:spMkLst>
-            <pc:docMk/>
-            <pc:sldMk cId="2955131668" sldId="3676"/>
-            <ac:spMk id="11" creationId="{1ACE53EE-561F-CAC3-090B-2A3B8177FDFA}"/>
-          </ac:spMkLst>
-        </pc:spChg>
-      </pc:sldChg>
-      <pc:sldChg chg="new del">
-        <pc:chgData name="Peter Laudati" userId="fc1173ac-280e-4cfe-aafb-65006f84bb93" providerId="ADAL" clId="{58E3B4D3-A2DF-7F4C-AAEA-BED2DE260FD9}" dt="2022-08-18T18:52:46.477" v="4" actId="2696"/>
-        <pc:sldMkLst>
-          <pc:docMk/>
-          <pc:sldMk cId="4059191753" sldId="3676"/>
-        </pc:sldMkLst>
-      </pc:sldChg>
-      <pc:sldChg chg="new del">
-        <pc:chgData name="Peter Laudati" userId="fc1173ac-280e-4cfe-aafb-65006f84bb93" providerId="ADAL" clId="{58E3B4D3-A2DF-7F4C-AAEA-BED2DE260FD9}" dt="2022-08-18T18:52:44.654" v="3" actId="2696"/>
-        <pc:sldMkLst>
-          <pc:docMk/>
-          <pc:sldMk cId="80496332" sldId="3677"/>
-        </pc:sldMkLst>
       </pc:sldChg>
     </pc:docChg>
   </pc:docChgLst>
@@ -372,7 +324,7 @@
           <a:p>
             <a:fld id="{D2F29697-4A6D-AC4B-B035-E737BE26C24F}" type="datetimeFigureOut">
               <a:rPr lang="en-US" smtClean="0"/>
-              <a:t>9/8/22</a:t>
+              <a:t>1/28/26</a:t>
             </a:fld>
             <a:endParaRPr lang="en-US"/>
           </a:p>
@@ -537,7 +489,7 @@
           <a:p>
             <a:fld id="{3B795838-E26F-BF4F-AF40-5695E293B9BE}" type="datetimeFigureOut">
               <a:rPr lang="en-US" smtClean="0"/>
-              <a:t>9/8/22</a:t>
+              <a:t>1/28/26</a:t>
             </a:fld>
             <a:endParaRPr lang="en-US"/>
           </a:p>
@@ -2647,7 +2599,7 @@
           <a:p>
             <a:fld id="{DFED49D2-CC62-47A6-8FD4-1840AC422660}" type="datetimeFigureOut">
               <a:rPr lang="en-US" smtClean="0"/>
-              <a:t>9/8/22</a:t>
+              <a:t>1/28/26</a:t>
             </a:fld>
             <a:endParaRPr lang="en-US"/>
           </a:p>
@@ -3002,7 +2954,7 @@
           <a:p>
             <a:fld id="{DFED49D2-CC62-47A6-8FD4-1840AC422660}" type="datetimeFigureOut">
               <a:rPr lang="en-US" smtClean="0"/>
-              <a:t>9/8/22</a:t>
+              <a:t>1/28/26</a:t>
             </a:fld>
             <a:endParaRPr lang="en-US"/>
           </a:p>
@@ -3200,7 +3152,7 @@
           <a:p>
             <a:fld id="{DFED49D2-CC62-47A6-8FD4-1840AC422660}" type="datetimeFigureOut">
               <a:rPr lang="en-US" smtClean="0"/>
-              <a:t>9/8/22</a:t>
+              <a:t>1/28/26</a:t>
             </a:fld>
             <a:endParaRPr lang="en-US"/>
           </a:p>
@@ -3408,7 +3360,7 @@
           <a:p>
             <a:fld id="{DFED49D2-CC62-47A6-8FD4-1840AC422660}" type="datetimeFigureOut">
               <a:rPr lang="en-US" smtClean="0"/>
-              <a:t>9/8/22</a:t>
+              <a:t>1/28/26</a:t>
             </a:fld>
             <a:endParaRPr lang="en-US"/>
           </a:p>
@@ -3975,7 +3927,7 @@
           <a:p>
             <a:fld id="{DFED49D2-CC62-47A6-8FD4-1840AC422660}" type="datetimeFigureOut">
               <a:rPr lang="en-US" smtClean="0"/>
-              <a:t>9/8/22</a:t>
+              <a:t>1/28/26</a:t>
             </a:fld>
             <a:endParaRPr lang="en-US" dirty="0"/>
           </a:p>
@@ -4195,7 +4147,7 @@
           <a:p>
             <a:fld id="{DFED49D2-CC62-47A6-8FD4-1840AC422660}" type="datetimeFigureOut">
               <a:rPr lang="en-US" smtClean="0"/>
-              <a:t>9/8/22</a:t>
+              <a:t>1/28/26</a:t>
             </a:fld>
             <a:endParaRPr lang="en-US"/>
           </a:p>
@@ -4532,7 +4484,7 @@
           <a:p>
             <a:fld id="{DFED49D2-CC62-47A6-8FD4-1840AC422660}" type="datetimeFigureOut">
               <a:rPr lang="en-US" smtClean="0"/>
-              <a:t>9/8/22</a:t>
+              <a:t>1/28/26</a:t>
             </a:fld>
             <a:endParaRPr lang="en-US"/>
           </a:p>
@@ -4833,7 +4785,7 @@
           <a:p>
             <a:fld id="{DFED49D2-CC62-47A6-8FD4-1840AC422660}" type="datetimeFigureOut">
               <a:rPr lang="en-US" smtClean="0"/>
-              <a:t>9/8/22</a:t>
+              <a:t>1/28/26</a:t>
             </a:fld>
             <a:endParaRPr lang="en-US"/>
           </a:p>
@@ -5245,7 +5197,7 @@
           <a:p>
             <a:fld id="{DFED49D2-CC62-47A6-8FD4-1840AC422660}" type="datetimeFigureOut">
               <a:rPr lang="en-US" smtClean="0"/>
-              <a:t>9/8/22</a:t>
+              <a:t>1/28/26</a:t>
             </a:fld>
             <a:endParaRPr lang="en-US"/>
           </a:p>
@@ -5391,7 +5343,7 @@
           <a:p>
             <a:fld id="{DFED49D2-CC62-47A6-8FD4-1840AC422660}" type="datetimeFigureOut">
               <a:rPr lang="en-US" smtClean="0"/>
-              <a:t>9/8/22</a:t>
+              <a:t>1/28/26</a:t>
             </a:fld>
             <a:endParaRPr lang="en-US"/>
           </a:p>
@@ -5504,7 +5456,7 @@
           <a:p>
             <a:fld id="{DFED49D2-CC62-47A6-8FD4-1840AC422660}" type="datetimeFigureOut">
               <a:rPr lang="en-US" smtClean="0"/>
-              <a:t>9/8/22</a:t>
+              <a:t>1/28/26</a:t>
             </a:fld>
             <a:endParaRPr lang="en-US"/>
           </a:p>
@@ -5815,7 +5767,7 @@
           <a:p>
             <a:fld id="{DFED49D2-CC62-47A6-8FD4-1840AC422660}" type="datetimeFigureOut">
               <a:rPr lang="en-US" smtClean="0"/>
-              <a:t>9/8/22</a:t>
+              <a:t>1/28/26</a:t>
             </a:fld>
             <a:endParaRPr lang="en-US"/>
           </a:p>
@@ -6056,7 +6008,7 @@
           <a:p>
             <a:fld id="{DFED49D2-CC62-47A6-8FD4-1840AC422660}" type="datetimeFigureOut">
               <a:rPr lang="en-US" smtClean="0"/>
-              <a:t>9/8/22</a:t>
+              <a:t>1/28/26</a:t>
             </a:fld>
             <a:endParaRPr lang="en-US"/>
           </a:p>
@@ -6554,8 +6506,33 @@
                 <a:ea typeface="+mn-ea"/>
                 <a:cs typeface="Segoe UI" panose="020B0502040204020203" pitchFamily="34" charset="0"/>
               </a:rPr>
-              <a:t>&lt;Insert Hack Name Here&gt;</a:t>
-            </a:r>
+              <a:t>🚀 </a:t>
+            </a:r>
+            <a:r>
+              <a:rPr lang="en-US" dirty="0" err="1">
+                <a:ln w="3175">
+                  <a:noFill/>
+                </a:ln>
+                <a:solidFill>
+                  <a:srgbClr val="9966FF"/>
+                </a:solidFill>
+                <a:latin typeface="Segoe UI" panose="020B0502040204020203" pitchFamily="34" charset="0"/>
+                <a:ea typeface="+mn-ea"/>
+                <a:cs typeface="Segoe UI" panose="020B0502040204020203" pitchFamily="34" charset="0"/>
+              </a:rPr>
+              <a:t>WanderAI</a:t>
+            </a:r>
+            <a:endParaRPr lang="en-US" dirty="0">
+              <a:ln w="3175">
+                <a:noFill/>
+              </a:ln>
+              <a:solidFill>
+                <a:srgbClr val="9966FF"/>
+              </a:solidFill>
+              <a:latin typeface="Segoe UI" panose="020B0502040204020203" pitchFamily="34" charset="0"/>
+              <a:ea typeface="+mn-ea"/>
+              <a:cs typeface="Segoe UI" panose="020B0502040204020203" pitchFamily="34" charset="0"/>
+            </a:endParaRPr>
           </a:p>
         </p:txBody>
       </p:sp>
@@ -6580,7 +6557,10 @@
           <a:bodyPr/>
           <a:lstStyle/>
           <a:p>
-            <a:endParaRPr lang="en-US" dirty="0"/>
+            <a:r>
+              <a:rPr lang="en-US" dirty="0"/>
+              <a:t>Your Travel Planning Startup</a:t>
+            </a:r>
           </a:p>
         </p:txBody>
       </p:sp>
@@ -7846,7 +7826,27 @@
                 <a:latin typeface="Segoe UI Light" panose="020B0502040204020203" pitchFamily="34" charset="0"/>
                 <a:cs typeface="Segoe UI Light" panose="020B0502040204020203" pitchFamily="34" charset="0"/>
               </a:rPr>
-              <a:t>&lt;Insert Hack Name Here&gt;</a:t>
+              <a:t>🚀 </a:t>
+            </a:r>
+            <a:r>
+              <a:rPr lang="en-US" sz="12800" dirty="0" err="1">
+                <a:solidFill>
+                  <a:srgbClr val="7030A0"/>
+                </a:solidFill>
+                <a:latin typeface="Segoe UI Light" panose="020B0502040204020203" pitchFamily="34" charset="0"/>
+                <a:cs typeface="Segoe UI Light" panose="020B0502040204020203" pitchFamily="34" charset="0"/>
+              </a:rPr>
+              <a:t>WanderAI</a:t>
+            </a:r>
+            <a:r>
+              <a:rPr lang="en-US" sz="12800" dirty="0">
+                <a:solidFill>
+                  <a:srgbClr val="7030A0"/>
+                </a:solidFill>
+                <a:latin typeface="Segoe UI Light" panose="020B0502040204020203" pitchFamily="34" charset="0"/>
+                <a:cs typeface="Segoe UI Light" panose="020B0502040204020203" pitchFamily="34" charset="0"/>
+              </a:rPr>
+              <a:t> - Your Travel Planning Startup</a:t>
             </a:r>
           </a:p>
           <a:p>
@@ -8004,7 +8004,7 @@
                 <a:ea typeface="+mn-ea"/>
                 <a:cs typeface="Segoe UI" panose="020B0502040204020203" pitchFamily="34" charset="0"/>
               </a:rPr>
-              <a:t>&lt;Coach Name&gt;</a:t>
+              <a:t>Harry Kimpel</a:t>
             </a:r>
           </a:p>
         </p:txBody>
@@ -8070,7 +8070,7 @@
                 <a:latin typeface="Segoe UI" panose="020B0502040204020203" pitchFamily="34" charset="0"/>
                 <a:cs typeface="Segoe UI" panose="020B0502040204020203" pitchFamily="34" charset="0"/>
               </a:rPr>
-              <a:t>&lt;Coach Title&gt;</a:t>
+              <a:t>DevRel @ New Relic</a:t>
             </a:r>
           </a:p>
         </p:txBody>
@@ -8562,14 +8562,14 @@
                 <a:cs typeface="Segoe UI" panose="020B0502040204020203" pitchFamily="34" charset="0"/>
                 <a:hlinkClick r:id="rId3"/>
               </a:rPr>
-              <a:t>Install Windows Subsystem for Linux</a:t>
+              <a:t>Deploy Microsoft Foundry</a:t>
             </a:r>
             <a:r>
               <a:rPr lang="en-US" sz="2800" dirty="0">
                 <a:latin typeface="Segoe UI" panose="020B0502040204020203" pitchFamily="34" charset="0"/>
                 <a:cs typeface="Segoe UI" panose="020B0502040204020203" pitchFamily="34" charset="0"/>
               </a:rPr>
-              <a:t> (Bash Shell)</a:t>
+              <a:t> (incl. base LLM model)</a:t>
             </a:r>
           </a:p>
           <a:p>
@@ -8579,66 +8579,7 @@
                 <a:cs typeface="Segoe UI" panose="020B0502040204020203" pitchFamily="34" charset="0"/>
                 <a:hlinkClick r:id="rId4"/>
               </a:rPr>
-              <a:t>Install the Azure CLI</a:t>
-            </a:r>
-            <a:r>
-              <a:rPr lang="en-US" sz="2800" dirty="0">
-                <a:latin typeface="Segoe UI" panose="020B0502040204020203" pitchFamily="34" charset="0"/>
-                <a:cs typeface="Segoe UI" panose="020B0502040204020203" pitchFamily="34" charset="0"/>
-              </a:rPr>
-              <a:t> (in WSL if on Windows!) </a:t>
-            </a:r>
-          </a:p>
-          <a:p>
-            <a:r>
-              <a:rPr lang="en-US" sz="2800" dirty="0">
-                <a:latin typeface="Segoe UI" panose="020B0502040204020203" pitchFamily="34" charset="0"/>
-                <a:cs typeface="Segoe UI" panose="020B0502040204020203" pitchFamily="34" charset="0"/>
-                <a:hlinkClick r:id="rId5"/>
-              </a:rPr>
-              <a:t>Install PowerShell Cmdlets for Azure</a:t>
-            </a:r>
-            <a:endParaRPr lang="en-US" sz="2800" dirty="0">
-              <a:latin typeface="Segoe UI" panose="020B0502040204020203" pitchFamily="34" charset="0"/>
-              <a:cs typeface="Segoe UI" panose="020B0502040204020203" pitchFamily="34" charset="0"/>
-            </a:endParaRPr>
-          </a:p>
-          <a:p>
-            <a:r>
-              <a:rPr lang="en-US" sz="2800" dirty="0">
-                <a:latin typeface="Segoe UI" panose="020B0502040204020203" pitchFamily="34" charset="0"/>
-                <a:cs typeface="Segoe UI" panose="020B0502040204020203" pitchFamily="34" charset="0"/>
-                <a:hlinkClick r:id="rId6"/>
-              </a:rPr>
-              <a:t>Install Visual Studio Code</a:t>
-            </a:r>
-            <a:endParaRPr lang="en-US" sz="2800" dirty="0">
-              <a:latin typeface="Segoe UI" panose="020B0502040204020203" pitchFamily="34" charset="0"/>
-              <a:cs typeface="Segoe UI" panose="020B0502040204020203" pitchFamily="34" charset="0"/>
-            </a:endParaRPr>
-          </a:p>
-          <a:p>
-            <a:r>
-              <a:rPr lang="en-US" sz="2800" dirty="0">
-                <a:latin typeface="Segoe UI" panose="020B0502040204020203" pitchFamily="34" charset="0"/>
-                <a:cs typeface="Segoe UI" panose="020B0502040204020203" pitchFamily="34" charset="0"/>
-                <a:hlinkClick r:id="rId7"/>
-              </a:rPr>
-              <a:t>Install ARM Tools extension for VS Code</a:t>
-            </a:r>
-            <a:endParaRPr lang="en-US" sz="2800" dirty="0">
-              <a:latin typeface="Segoe UI" panose="020B0502040204020203" pitchFamily="34" charset="0"/>
-              <a:cs typeface="Segoe UI" panose="020B0502040204020203" pitchFamily="34" charset="0"/>
-            </a:endParaRPr>
-          </a:p>
-          <a:p>
-            <a:r>
-              <a:rPr lang="en-US" sz="2800" dirty="0">
-                <a:latin typeface="Segoe UI" panose="020B0502040204020203" pitchFamily="34" charset="0"/>
-                <a:cs typeface="Segoe UI" panose="020B0502040204020203" pitchFamily="34" charset="0"/>
-                <a:hlinkClick r:id="rId8"/>
-              </a:rPr>
-              <a:t>Install Bicep extension for VS Code</a:t>
+              <a:t>Deploy Azure Native New Relic Service</a:t>
             </a:r>
             <a:endParaRPr lang="en-US" sz="2800" dirty="0">
               <a:latin typeface="Segoe UI" panose="020B0502040204020203" pitchFamily="34" charset="0"/>
@@ -8734,7 +8675,14 @@
           <a:p>
             <a:r>
               <a:rPr lang="en-US" dirty="0"/>
-              <a:t>Challenge 1 Topic Header</a:t>
+              <a:t>Challenge 1</a:t>
+            </a:r>
+            <a:br>
+              <a:rPr lang="en-US" dirty="0"/>
+            </a:br>
+            <a:r>
+              <a:rPr lang="en-US" dirty="0"/>
+              <a:t>- Master the Foundations</a:t>
             </a:r>
           </a:p>
         </p:txBody>
@@ -8757,12 +8705,15 @@
         </p:nvSpPr>
         <p:spPr/>
         <p:txBody>
-          <a:bodyPr/>
-          <a:lstStyle/>
-          <a:p>
+          <a:bodyPr>
+            <a:normAutofit fontScale="92500" lnSpcReduction="20000"/>
+          </a:bodyPr>
+          <a:lstStyle/>
+          <a:p>
+            <a:pPr algn="ctr"/>
             <a:r>
               <a:rPr lang="en-US" dirty="0"/>
-              <a:t>Sub-Topic Title</a:t>
+              <a:t>Foundational knowledge of AI agents, the Microsoft Agent Framework, &amp; observability concepts</a:t>
             </a:r>
           </a:p>
         </p:txBody>
@@ -11665,6 +11616,15 @@
 </file>
 
 <file path=customXml/item1.xml><?xml version="1.0" encoding="utf-8"?>
+<?mso-contentType ?>
+<FormTemplates xmlns="http://schemas.microsoft.com/sharepoint/v3/contenttype/forms">
+  <Display>DocumentLibraryForm</Display>
+  <Edit>DocumentLibraryForm</Edit>
+  <New>DocumentLibraryForm</New>
+</FormTemplates>
+</file>
+
+<file path=customXml/item2.xml><?xml version="1.0" encoding="utf-8"?>
 <p:properties xmlns:p="http://schemas.microsoft.com/office/2006/metadata/properties" xmlns:xsi="http://www.w3.org/2001/XMLSchema-instance" xmlns:pc="http://schemas.microsoft.com/office/infopath/2007/PartnerControls">
   <documentManagement>
     <_ip_UnifiedCompliancePolicyUIAction xmlns="http://schemas.microsoft.com/sharepoint/v3" xsi:nil="true"/>
@@ -11676,15 +11636,6 @@
     </lcf76f155ced4ddcb4097134ff3c332f>
   </documentManagement>
 </p:properties>
-</file>
-
-<file path=customXml/item2.xml><?xml version="1.0" encoding="utf-8"?>
-<?mso-contentType ?>
-<FormTemplates xmlns="http://schemas.microsoft.com/sharepoint/v3/contenttype/forms">
-  <Display>DocumentLibraryForm</Display>
-  <Edit>DocumentLibraryForm</Edit>
-  <New>DocumentLibraryForm</New>
-</FormTemplates>
 </file>
 
 <file path=customXml/item3.xml><?xml version="1.0" encoding="utf-8"?>
@@ -11961,24 +11912,6 @@
 </file>
 
 <file path=customXml/itemProps1.xml><?xml version="1.0" encoding="utf-8"?>
-<ds:datastoreItem xmlns:ds="http://schemas.openxmlformats.org/officeDocument/2006/customXml" ds:itemID="{FE1AEC35-FA48-4D92-B146-8AAF6D580B36}">
-  <ds:schemaRefs>
-    <ds:schemaRef ds:uri="http://schemas.microsoft.com/office/2006/documentManagement/types"/>
-    <ds:schemaRef ds:uri="http://purl.org/dc/dcmitype/"/>
-    <ds:schemaRef ds:uri="http://purl.org/dc/elements/1.1/"/>
-    <ds:schemaRef ds:uri="http://schemas.microsoft.com/sharepoint/v3"/>
-    <ds:schemaRef ds:uri="http://schemas.microsoft.com/office/infopath/2007/PartnerControls"/>
-    <ds:schemaRef ds:uri="http://schemas.microsoft.com/office/2006/metadata/properties"/>
-    <ds:schemaRef ds:uri="http://purl.org/dc/terms/"/>
-    <ds:schemaRef ds:uri="230e9df3-be65-4c73-a93b-d1236ebd677e"/>
-    <ds:schemaRef ds:uri="http://schemas.openxmlformats.org/package/2006/metadata/core-properties"/>
-    <ds:schemaRef ds:uri="d5681aaf-e75d-4680-b6a5-67eaf1333073"/>
-    <ds:schemaRef ds:uri="http://www.w3.org/XML/1998/namespace"/>
-  </ds:schemaRefs>
-</ds:datastoreItem>
-</file>
-
-<file path=customXml/itemProps2.xml><?xml version="1.0" encoding="utf-8"?>
 <ds:datastoreItem xmlns:ds="http://schemas.openxmlformats.org/officeDocument/2006/customXml" ds:itemID="{FA84066F-CF25-477A-816A-71B1599BA426}">
   <ds:schemaRefs>
     <ds:schemaRef ds:uri="http://schemas.microsoft.com/sharepoint/v3/contenttype/forms"/>
@@ -11986,8 +11919,44 @@
 </ds:datastoreItem>
 </file>
 
+<file path=customXml/itemProps2.xml><?xml version="1.0" encoding="utf-8"?>
+<ds:datastoreItem xmlns:ds="http://schemas.openxmlformats.org/officeDocument/2006/customXml" ds:itemID="{FE1AEC35-FA48-4D92-B146-8AAF6D580B36}">
+  <ds:schemaRefs>
+    <ds:schemaRef ds:uri="http://schemas.microsoft.com/office/2006/documentManagement/types"/>
+    <ds:schemaRef ds:uri="http://schemas.microsoft.com/office/2006/metadata/properties"/>
+    <ds:schemaRef ds:uri="http://purl.org/dc/dcmitype/"/>
+    <ds:schemaRef ds:uri="http://schemas.microsoft.com/office/infopath/2007/PartnerControls"/>
+    <ds:schemaRef ds:uri="http://schemas.openxmlformats.org/package/2006/metadata/core-properties"/>
+    <ds:schemaRef ds:uri="15d470b8-ee0f-4c7c-b3dd-47210eefc9bb"/>
+    <ds:schemaRef ds:uri="http://www.w3.org/XML/1998/namespace"/>
+    <ds:schemaRef ds:uri="d5681aaf-e75d-4680-b6a5-67eaf1333073"/>
+    <ds:schemaRef ds:uri="http://purl.org/dc/elements/1.1/"/>
+    <ds:schemaRef ds:uri="230e9df3-be65-4c73-a93b-d1236ebd677e"/>
+    <ds:schemaRef ds:uri="http://schemas.microsoft.com/sharepoint/v3"/>
+    <ds:schemaRef ds:uri="http://purl.org/dc/terms/"/>
+  </ds:schemaRefs>
+</ds:datastoreItem>
+</file>
+
 <file path=customXml/itemProps3.xml><?xml version="1.0" encoding="utf-8"?>
-<ds:datastoreItem xmlns:ds="http://schemas.openxmlformats.org/officeDocument/2006/customXml" ds:itemID="{D297C88A-D0C3-4811-9063-F2652EC3F003}"/>
+<ds:datastoreItem xmlns:ds="http://schemas.openxmlformats.org/officeDocument/2006/customXml" ds:itemID="{D297C88A-D0C3-4811-9063-F2652EC3F003}">
+  <ds:schemaRefs>
+    <ds:schemaRef ds:uri="http://schemas.microsoft.com/office/2006/metadata/contentType"/>
+    <ds:schemaRef ds:uri="http://schemas.microsoft.com/office/2006/metadata/properties/metaAttributes"/>
+    <ds:schemaRef ds:uri="http://www.w3.org/2001/XMLSchema"/>
+    <ds:schemaRef ds:uri="http://schemas.microsoft.com/office/2006/metadata/properties"/>
+    <ds:schemaRef ds:uri="http://schemas.microsoft.com/sharepoint/v3"/>
+    <ds:schemaRef ds:uri="d5681aaf-e75d-4680-b6a5-67eaf1333073"/>
+    <ds:schemaRef ds:uri="230e9df3-be65-4c73-a93b-d1236ebd677e"/>
+    <ds:schemaRef ds:uri="15d470b8-ee0f-4c7c-b3dd-47210eefc9bb"/>
+    <ds:schemaRef ds:uri="http://schemas.microsoft.com/office/2006/documentManagement/types"/>
+    <ds:schemaRef ds:uri="http://schemas.microsoft.com/office/infopath/2007/PartnerControls"/>
+    <ds:schemaRef ds:uri="http://schemas.openxmlformats.org/package/2006/metadata/core-properties"/>
+    <ds:schemaRef ds:uri="http://purl.org/dc/elements/1.1/"/>
+    <ds:schemaRef ds:uri="http://purl.org/dc/terms/"/>
+    <ds:schemaRef ds:uri="http://schemas.microsoft.com/internal/obd"/>
+  </ds:schemaRefs>
+</ds:datastoreItem>
 </file>
 
 <file path=docMetadata/LabelInfo.xml><?xml version="1.0" encoding="utf-8"?>

</xml_diff>